<commit_message>
new slides added to presentation.
</commit_message>
<xml_diff>
--- a/Presentations/CAMWS_2016/Gorman_camws_2016.pptx
+++ b/Presentations/CAMWS_2016/Gorman_camws_2016.pptx
@@ -5,14 +5,20 @@
     <p:sldMasterId id="2147483660" r:id="rId1"/>
   </p:sldMasterIdLst>
   <p:notesMasterIdLst>
-    <p:notesMasterId r:id="rId7"/>
+    <p:notesMasterId r:id="rId13"/>
   </p:notesMasterIdLst>
   <p:sldIdLst>
-    <p:sldId id="258" r:id="rId2"/>
-    <p:sldId id="259" r:id="rId3"/>
-    <p:sldId id="260" r:id="rId4"/>
-    <p:sldId id="261" r:id="rId5"/>
-    <p:sldId id="262" r:id="rId6"/>
+    <p:sldId id="263" r:id="rId2"/>
+    <p:sldId id="264" r:id="rId3"/>
+    <p:sldId id="267" r:id="rId4"/>
+    <p:sldId id="265" r:id="rId5"/>
+    <p:sldId id="268" r:id="rId6"/>
+    <p:sldId id="266" r:id="rId7"/>
+    <p:sldId id="258" r:id="rId8"/>
+    <p:sldId id="259" r:id="rId9"/>
+    <p:sldId id="260" r:id="rId10"/>
+    <p:sldId id="261" r:id="rId11"/>
+    <p:sldId id="262" r:id="rId12"/>
   </p:sldIdLst>
   <p:sldSz cx="12192000" cy="6858000"/>
   <p:notesSz cx="6858000" cy="9144000"/>
@@ -204,7 +210,7 @@
           <a:p>
             <a:fld id="{B126904A-A4F5-408B-B318-7ABD31E5B746}" type="datetimeFigureOut">
               <a:rPr lang="en-US" smtClean="0"/>
-              <a:t>3/15/2016</a:t>
+              <a:t>3/16/2016</a:t>
             </a:fld>
             <a:endParaRPr lang="en-US"/>
           </a:p>
@@ -518,37 +524,11 @@
           <a:p>
             <a:r>
               <a:rPr lang="en-US" dirty="0" smtClean="0"/>
-              <a:t>Data so far is interesting and</a:t>
+              <a:t>Students</a:t>
             </a:r>
             <a:r>
               <a:rPr lang="en-US" baseline="0" dirty="0" smtClean="0"/>
-              <a:t> its collection usefully automated.</a:t>
-            </a:r>
-          </a:p>
-          <a:p>
-            <a:r>
-              <a:rPr lang="en-US" dirty="0" smtClean="0"/>
-              <a:t>It is utterly traditional</a:t>
-            </a:r>
-          </a:p>
-          <a:p>
-            <a:r>
-              <a:rPr lang="en-US" dirty="0" smtClean="0"/>
-              <a:t>It is not very “</a:t>
-            </a:r>
-            <a:r>
-              <a:rPr lang="en-US" dirty="0" err="1" smtClean="0"/>
-              <a:t>treeish</a:t>
-            </a:r>
-            <a:r>
-              <a:rPr lang="en-US" dirty="0" smtClean="0"/>
-              <a:t>.”</a:t>
-            </a:r>
-          </a:p>
-          <a:p>
-            <a:r>
-              <a:rPr lang="en-US" dirty="0" smtClean="0"/>
-              <a:t>The “head” assigned by a student to a word is somewhat different</a:t>
+              <a:t> are asked to correctly identify every form</a:t>
             </a:r>
           </a:p>
           <a:p>
@@ -557,12 +537,8 @@
               <a:buChar char="•"/>
             </a:pPr>
             <a:r>
-              <a:rPr lang="en-US" dirty="0" smtClean="0"/>
-              <a:t>it</a:t>
-            </a:r>
-            <a:r>
               <a:rPr lang="en-US" baseline="0" dirty="0" smtClean="0"/>
-              <a:t> can also be put in traditional terms: a given adjective is and attribute of a given noun, for example</a:t>
+              <a:t>Lemma</a:t>
             </a:r>
           </a:p>
           <a:p>
@@ -572,53 +548,8 @@
             </a:pPr>
             <a:r>
               <a:rPr lang="en-US" baseline="0" dirty="0" smtClean="0"/>
-              <a:t>But it is also quite different than the other data examined so far</a:t>
-            </a:r>
-          </a:p>
-          <a:p>
-            <a:pPr marL="628650" lvl="1" indent="-171450">
-              <a:buFont typeface="Arial" panose="020B0604020202020204" pitchFamily="34" charset="0"/>
-              <a:buChar char="•"/>
-            </a:pPr>
-            <a:r>
-              <a:rPr lang="en-US" baseline="0" dirty="0" smtClean="0"/>
-              <a:t>We understand what it means when a student mislabels a Relationship: SBJ for </a:t>
-            </a:r>
-            <a:r>
-              <a:rPr lang="en-US" baseline="0" dirty="0" err="1" smtClean="0"/>
-              <a:t>Poss</a:t>
-            </a:r>
-            <a:endParaRPr lang="en-US" baseline="0" dirty="0" smtClean="0"/>
-          </a:p>
-          <a:p>
-            <a:pPr marL="628650" lvl="1" indent="-171450">
-              <a:buFont typeface="Arial" panose="020B0604020202020204" pitchFamily="34" charset="0"/>
-              <a:buChar char="•"/>
-            </a:pPr>
-            <a:r>
-              <a:rPr lang="en-US" baseline="0" dirty="0" smtClean="0"/>
-              <a:t>But evaluating head data presents difficulties</a:t>
-            </a:r>
-          </a:p>
-          <a:p>
-            <a:pPr marL="628650" lvl="1" indent="-171450">
-              <a:buFont typeface="Arial" panose="020B0604020202020204" pitchFamily="34" charset="0"/>
-              <a:buChar char="•"/>
-            </a:pPr>
-            <a:r>
-              <a:rPr lang="en-US" baseline="0" dirty="0" smtClean="0"/>
-              <a:t>It cannot be interpreted without looking at the tree as a whole: it is the more </a:t>
-            </a:r>
-            <a:r>
-              <a:rPr lang="en-US" baseline="0" dirty="0" err="1" smtClean="0"/>
-              <a:t>treeish</a:t>
-            </a:r>
-            <a:r>
-              <a:rPr lang="en-US" baseline="0" dirty="0" smtClean="0"/>
-              <a:t> part of the data</a:t>
-            </a:r>
-          </a:p>
-          <a:p>
+              <a:t>All relevant morphological information</a:t>
+            </a:r>
             <a:endParaRPr lang="en-US" dirty="0"/>
           </a:p>
         </p:txBody>
@@ -640,7 +571,7 @@
           <a:p>
             <a:fld id="{B3E9124A-7BF9-46DF-BFFC-8F8BB6FC65EB}" type="slidenum">
               <a:rPr lang="en-US" smtClean="0"/>
-              <a:t>1</a:t>
+              <a:t>2</a:t>
             </a:fld>
             <a:endParaRPr lang="en-US"/>
           </a:p>
@@ -649,7 +580,7 @@
     </p:spTree>
     <p:extLst>
       <p:ext uri="{BB962C8B-B14F-4D97-AF65-F5344CB8AC3E}">
-        <p14:creationId xmlns:p14="http://schemas.microsoft.com/office/powerpoint/2010/main" val="57256476"/>
+        <p14:creationId xmlns:p14="http://schemas.microsoft.com/office/powerpoint/2010/main" val="1394287972"/>
       </p:ext>
     </p:extLst>
   </p:cSld>
@@ -703,7 +634,35 @@
           <a:bodyPr/>
           <a:lstStyle/>
           <a:p>
-            <a:endParaRPr lang="en-US"/>
+            <a:r>
+              <a:rPr lang="en-US" dirty="0" smtClean="0"/>
+              <a:t>Students are also asked</a:t>
+            </a:r>
+            <a:r>
+              <a:rPr lang="en-US" baseline="0" dirty="0" smtClean="0"/>
+              <a:t> to specify the dependency relationship</a:t>
+            </a:r>
+          </a:p>
+          <a:p>
+            <a:pPr marL="171450" indent="-171450">
+              <a:buFont typeface="Arial" panose="020B0604020202020204" pitchFamily="34" charset="0"/>
+              <a:buChar char="•"/>
+            </a:pPr>
+            <a:r>
+              <a:rPr lang="en-US" baseline="0" dirty="0" smtClean="0"/>
+              <a:t>The list can be customized to meet classroom needs</a:t>
+            </a:r>
+          </a:p>
+          <a:p>
+            <a:pPr marL="171450" indent="-171450">
+              <a:buFont typeface="Arial" panose="020B0604020202020204" pitchFamily="34" charset="0"/>
+              <a:buChar char="•"/>
+            </a:pPr>
+            <a:r>
+              <a:rPr lang="en-US" baseline="0" dirty="0" smtClean="0"/>
+              <a:t>Here is list of clauses known to the students</a:t>
+            </a:r>
+            <a:endParaRPr lang="en-US" dirty="0"/>
           </a:p>
         </p:txBody>
       </p:sp>
@@ -724,7 +683,454 @@
           <a:p>
             <a:fld id="{B3E9124A-7BF9-46DF-BFFC-8F8BB6FC65EB}" type="slidenum">
               <a:rPr lang="en-US" smtClean="0"/>
-              <a:t>2</a:t>
+              <a:t>3</a:t>
+            </a:fld>
+            <a:endParaRPr lang="en-US"/>
+          </a:p>
+        </p:txBody>
+      </p:sp>
+    </p:spTree>
+    <p:extLst>
+      <p:ext uri="{BB962C8B-B14F-4D97-AF65-F5344CB8AC3E}">
+        <p14:creationId xmlns:p14="http://schemas.microsoft.com/office/powerpoint/2010/main" val="3569651408"/>
+      </p:ext>
+    </p:extLst>
+  </p:cSld>
+  <p:clrMapOvr>
+    <a:masterClrMapping/>
+  </p:clrMapOvr>
+</p:notes>
+</file>
+
+<file path=ppt/notesSlides/notesSlide3.xml><?xml version="1.0" encoding="utf-8"?>
+<p:notes xmlns:a="http://schemas.openxmlformats.org/drawingml/2006/main" xmlns:r="http://schemas.openxmlformats.org/officeDocument/2006/relationships" xmlns:p="http://schemas.openxmlformats.org/presentationml/2006/main">
+  <p:cSld>
+    <p:spTree>
+      <p:nvGrpSpPr>
+        <p:cNvPr id="1" name=""/>
+        <p:cNvGrpSpPr/>
+        <p:nvPr/>
+      </p:nvGrpSpPr>
+      <p:grpSpPr>
+        <a:xfrm>
+          <a:off x="0" y="0"/>
+          <a:ext cx="0" cy="0"/>
+          <a:chOff x="0" y="0"/>
+          <a:chExt cx="0" cy="0"/>
+        </a:xfrm>
+      </p:grpSpPr>
+      <p:sp>
+        <p:nvSpPr>
+          <p:cNvPr id="2" name="Slide Image Placeholder 1"/>
+          <p:cNvSpPr>
+            <a:spLocks noGrp="1" noRot="1" noChangeAspect="1"/>
+          </p:cNvSpPr>
+          <p:nvPr>
+            <p:ph type="sldImg"/>
+          </p:nvPr>
+        </p:nvSpPr>
+        <p:spPr/>
+      </p:sp>
+      <p:sp>
+        <p:nvSpPr>
+          <p:cNvPr id="3" name="Notes Placeholder 2"/>
+          <p:cNvSpPr>
+            <a:spLocks noGrp="1"/>
+          </p:cNvSpPr>
+          <p:nvPr>
+            <p:ph type="body" idx="1"/>
+          </p:nvPr>
+        </p:nvSpPr>
+        <p:spPr/>
+        <p:txBody>
+          <a:bodyPr/>
+          <a:lstStyle/>
+          <a:p>
+            <a:r>
+              <a:rPr lang="en-US" dirty="0" smtClean="0"/>
+              <a:t>Underlying XML</a:t>
+            </a:r>
+            <a:endParaRPr lang="en-US" dirty="0"/>
+          </a:p>
+        </p:txBody>
+      </p:sp>
+      <p:sp>
+        <p:nvSpPr>
+          <p:cNvPr id="4" name="Slide Number Placeholder 3"/>
+          <p:cNvSpPr>
+            <a:spLocks noGrp="1"/>
+          </p:cNvSpPr>
+          <p:nvPr>
+            <p:ph type="sldNum" sz="quarter" idx="10"/>
+          </p:nvPr>
+        </p:nvSpPr>
+        <p:spPr/>
+        <p:txBody>
+          <a:bodyPr/>
+          <a:lstStyle/>
+          <a:p>
+            <a:fld id="{B3E9124A-7BF9-46DF-BFFC-8F8BB6FC65EB}" type="slidenum">
+              <a:rPr lang="en-US" smtClean="0"/>
+              <a:t>4</a:t>
+            </a:fld>
+            <a:endParaRPr lang="en-US"/>
+          </a:p>
+        </p:txBody>
+      </p:sp>
+    </p:spTree>
+    <p:extLst>
+      <p:ext uri="{BB962C8B-B14F-4D97-AF65-F5344CB8AC3E}">
+        <p14:creationId xmlns:p14="http://schemas.microsoft.com/office/powerpoint/2010/main" val="1474261016"/>
+      </p:ext>
+    </p:extLst>
+  </p:cSld>
+  <p:clrMapOvr>
+    <a:masterClrMapping/>
+  </p:clrMapOvr>
+</p:notes>
+</file>
+
+<file path=ppt/notesSlides/notesSlide4.xml><?xml version="1.0" encoding="utf-8"?>
+<p:notes xmlns:a="http://schemas.openxmlformats.org/drawingml/2006/main" xmlns:r="http://schemas.openxmlformats.org/officeDocument/2006/relationships" xmlns:p="http://schemas.openxmlformats.org/presentationml/2006/main">
+  <p:cSld>
+    <p:spTree>
+      <p:nvGrpSpPr>
+        <p:cNvPr id="1" name=""/>
+        <p:cNvGrpSpPr/>
+        <p:nvPr/>
+      </p:nvGrpSpPr>
+      <p:grpSpPr>
+        <a:xfrm>
+          <a:off x="0" y="0"/>
+          <a:ext cx="0" cy="0"/>
+          <a:chOff x="0" y="0"/>
+          <a:chExt cx="0" cy="0"/>
+        </a:xfrm>
+      </p:grpSpPr>
+      <p:sp>
+        <p:nvSpPr>
+          <p:cNvPr id="2" name="Slide Image Placeholder 1"/>
+          <p:cNvSpPr>
+            <a:spLocks noGrp="1" noRot="1" noChangeAspect="1"/>
+          </p:cNvSpPr>
+          <p:nvPr>
+            <p:ph type="sldImg"/>
+          </p:nvPr>
+        </p:nvSpPr>
+        <p:spPr/>
+      </p:sp>
+      <p:sp>
+        <p:nvSpPr>
+          <p:cNvPr id="3" name="Notes Placeholder 2"/>
+          <p:cNvSpPr>
+            <a:spLocks noGrp="1"/>
+          </p:cNvSpPr>
+          <p:nvPr>
+            <p:ph type="body" idx="1"/>
+          </p:nvPr>
+        </p:nvSpPr>
+        <p:spPr/>
+        <p:txBody>
+          <a:bodyPr/>
+          <a:lstStyle/>
+          <a:p>
+            <a:r>
+              <a:rPr lang="en-US" dirty="0" smtClean="0"/>
+              <a:t>Underlying XML</a:t>
+            </a:r>
+            <a:endParaRPr lang="en-US" dirty="0"/>
+          </a:p>
+        </p:txBody>
+      </p:sp>
+      <p:sp>
+        <p:nvSpPr>
+          <p:cNvPr id="4" name="Slide Number Placeholder 3"/>
+          <p:cNvSpPr>
+            <a:spLocks noGrp="1"/>
+          </p:cNvSpPr>
+          <p:nvPr>
+            <p:ph type="sldNum" sz="quarter" idx="10"/>
+          </p:nvPr>
+        </p:nvSpPr>
+        <p:spPr/>
+        <p:txBody>
+          <a:bodyPr/>
+          <a:lstStyle/>
+          <a:p>
+            <a:fld id="{B3E9124A-7BF9-46DF-BFFC-8F8BB6FC65EB}" type="slidenum">
+              <a:rPr lang="en-US" smtClean="0"/>
+              <a:t>5</a:t>
+            </a:fld>
+            <a:endParaRPr lang="en-US"/>
+          </a:p>
+        </p:txBody>
+      </p:sp>
+    </p:spTree>
+    <p:extLst>
+      <p:ext uri="{BB962C8B-B14F-4D97-AF65-F5344CB8AC3E}">
+        <p14:creationId xmlns:p14="http://schemas.microsoft.com/office/powerpoint/2010/main" val="2734403786"/>
+      </p:ext>
+    </p:extLst>
+  </p:cSld>
+  <p:clrMapOvr>
+    <a:masterClrMapping/>
+  </p:clrMapOvr>
+</p:notes>
+</file>
+
+<file path=ppt/notesSlides/notesSlide5.xml><?xml version="1.0" encoding="utf-8"?>
+<p:notes xmlns:a="http://schemas.openxmlformats.org/drawingml/2006/main" xmlns:r="http://schemas.openxmlformats.org/officeDocument/2006/relationships" xmlns:p="http://schemas.openxmlformats.org/presentationml/2006/main">
+  <p:cSld>
+    <p:spTree>
+      <p:nvGrpSpPr>
+        <p:cNvPr id="1" name=""/>
+        <p:cNvGrpSpPr/>
+        <p:nvPr/>
+      </p:nvGrpSpPr>
+      <p:grpSpPr>
+        <a:xfrm>
+          <a:off x="0" y="0"/>
+          <a:ext cx="0" cy="0"/>
+          <a:chOff x="0" y="0"/>
+          <a:chExt cx="0" cy="0"/>
+        </a:xfrm>
+      </p:grpSpPr>
+      <p:sp>
+        <p:nvSpPr>
+          <p:cNvPr id="2" name="Slide Image Placeholder 1"/>
+          <p:cNvSpPr>
+            <a:spLocks noGrp="1" noRot="1" noChangeAspect="1"/>
+          </p:cNvSpPr>
+          <p:nvPr>
+            <p:ph type="sldImg"/>
+          </p:nvPr>
+        </p:nvSpPr>
+        <p:spPr/>
+      </p:sp>
+      <p:sp>
+        <p:nvSpPr>
+          <p:cNvPr id="3" name="Notes Placeholder 2"/>
+          <p:cNvSpPr>
+            <a:spLocks noGrp="1"/>
+          </p:cNvSpPr>
+          <p:nvPr>
+            <p:ph type="body" idx="1"/>
+          </p:nvPr>
+        </p:nvSpPr>
+        <p:spPr/>
+        <p:txBody>
+          <a:bodyPr/>
+          <a:lstStyle/>
+          <a:p>
+            <a:r>
+              <a:rPr lang="en-US" dirty="0" smtClean="0"/>
+              <a:t>Data so far is interesting and</a:t>
+            </a:r>
+            <a:r>
+              <a:rPr lang="en-US" baseline="0" dirty="0" smtClean="0"/>
+              <a:t> its collection usefully automated.</a:t>
+            </a:r>
+          </a:p>
+          <a:p>
+            <a:r>
+              <a:rPr lang="en-US" dirty="0" smtClean="0"/>
+              <a:t>It is utterly traditional</a:t>
+            </a:r>
+          </a:p>
+          <a:p>
+            <a:r>
+              <a:rPr lang="en-US" dirty="0" smtClean="0"/>
+              <a:t>It is not very “</a:t>
+            </a:r>
+            <a:r>
+              <a:rPr lang="en-US" dirty="0" err="1" smtClean="0"/>
+              <a:t>treeish</a:t>
+            </a:r>
+            <a:r>
+              <a:rPr lang="en-US" dirty="0" smtClean="0"/>
+              <a:t>.”</a:t>
+            </a:r>
+          </a:p>
+          <a:p>
+            <a:r>
+              <a:rPr lang="en-US" dirty="0" smtClean="0"/>
+              <a:t>The “head” assigned by a student to a word is somewhat different</a:t>
+            </a:r>
+          </a:p>
+          <a:p>
+            <a:pPr marL="171450" indent="-171450">
+              <a:buFont typeface="Arial" panose="020B0604020202020204" pitchFamily="34" charset="0"/>
+              <a:buChar char="•"/>
+            </a:pPr>
+            <a:r>
+              <a:rPr lang="en-US" dirty="0" smtClean="0"/>
+              <a:t>it</a:t>
+            </a:r>
+            <a:r>
+              <a:rPr lang="en-US" baseline="0" dirty="0" smtClean="0"/>
+              <a:t> can also be put in traditional terms: a given adjective is and attribute of a given noun, for example</a:t>
+            </a:r>
+          </a:p>
+          <a:p>
+            <a:pPr marL="171450" indent="-171450">
+              <a:buFont typeface="Arial" panose="020B0604020202020204" pitchFamily="34" charset="0"/>
+              <a:buChar char="•"/>
+            </a:pPr>
+            <a:r>
+              <a:rPr lang="en-US" baseline="0" dirty="0" smtClean="0"/>
+              <a:t>But it is also quite different than the other data examined so far</a:t>
+            </a:r>
+          </a:p>
+          <a:p>
+            <a:pPr marL="628650" lvl="1" indent="-171450">
+              <a:buFont typeface="Arial" panose="020B0604020202020204" pitchFamily="34" charset="0"/>
+              <a:buChar char="•"/>
+            </a:pPr>
+            <a:r>
+              <a:rPr lang="en-US" baseline="0" dirty="0" smtClean="0"/>
+              <a:t>We understand what it means when a student mislabels a Relationship: SBJ for </a:t>
+            </a:r>
+            <a:r>
+              <a:rPr lang="en-US" baseline="0" dirty="0" err="1" smtClean="0"/>
+              <a:t>Poss</a:t>
+            </a:r>
+            <a:endParaRPr lang="en-US" baseline="0" dirty="0" smtClean="0"/>
+          </a:p>
+          <a:p>
+            <a:pPr marL="628650" lvl="1" indent="-171450">
+              <a:buFont typeface="Arial" panose="020B0604020202020204" pitchFamily="34" charset="0"/>
+              <a:buChar char="•"/>
+            </a:pPr>
+            <a:r>
+              <a:rPr lang="en-US" baseline="0" dirty="0" smtClean="0"/>
+              <a:t>But evaluating head data presents difficulties</a:t>
+            </a:r>
+          </a:p>
+          <a:p>
+            <a:pPr marL="628650" lvl="1" indent="-171450">
+              <a:buFont typeface="Arial" panose="020B0604020202020204" pitchFamily="34" charset="0"/>
+              <a:buChar char="•"/>
+            </a:pPr>
+            <a:r>
+              <a:rPr lang="en-US" baseline="0" dirty="0" smtClean="0"/>
+              <a:t>It cannot be interpreted without looking at the tree as a whole: it is the more </a:t>
+            </a:r>
+            <a:r>
+              <a:rPr lang="en-US" baseline="0" dirty="0" err="1" smtClean="0"/>
+              <a:t>treeish</a:t>
+            </a:r>
+            <a:r>
+              <a:rPr lang="en-US" baseline="0" dirty="0" smtClean="0"/>
+              <a:t> part of the data</a:t>
+            </a:r>
+          </a:p>
+          <a:p>
+            <a:endParaRPr lang="en-US" dirty="0"/>
+          </a:p>
+        </p:txBody>
+      </p:sp>
+      <p:sp>
+        <p:nvSpPr>
+          <p:cNvPr id="4" name="Slide Number Placeholder 3"/>
+          <p:cNvSpPr>
+            <a:spLocks noGrp="1"/>
+          </p:cNvSpPr>
+          <p:nvPr>
+            <p:ph type="sldNum" sz="quarter" idx="10"/>
+          </p:nvPr>
+        </p:nvSpPr>
+        <p:spPr/>
+        <p:txBody>
+          <a:bodyPr/>
+          <a:lstStyle/>
+          <a:p>
+            <a:fld id="{B3E9124A-7BF9-46DF-BFFC-8F8BB6FC65EB}" type="slidenum">
+              <a:rPr lang="en-US" smtClean="0"/>
+              <a:t>7</a:t>
+            </a:fld>
+            <a:endParaRPr lang="en-US"/>
+          </a:p>
+        </p:txBody>
+      </p:sp>
+    </p:spTree>
+    <p:extLst>
+      <p:ext uri="{BB962C8B-B14F-4D97-AF65-F5344CB8AC3E}">
+        <p14:creationId xmlns:p14="http://schemas.microsoft.com/office/powerpoint/2010/main" val="57256476"/>
+      </p:ext>
+    </p:extLst>
+  </p:cSld>
+  <p:clrMapOvr>
+    <a:masterClrMapping/>
+  </p:clrMapOvr>
+</p:notes>
+</file>
+
+<file path=ppt/notesSlides/notesSlide6.xml><?xml version="1.0" encoding="utf-8"?>
+<p:notes xmlns:a="http://schemas.openxmlformats.org/drawingml/2006/main" xmlns:r="http://schemas.openxmlformats.org/officeDocument/2006/relationships" xmlns:p="http://schemas.openxmlformats.org/presentationml/2006/main">
+  <p:cSld>
+    <p:spTree>
+      <p:nvGrpSpPr>
+        <p:cNvPr id="1" name=""/>
+        <p:cNvGrpSpPr/>
+        <p:nvPr/>
+      </p:nvGrpSpPr>
+      <p:grpSpPr>
+        <a:xfrm>
+          <a:off x="0" y="0"/>
+          <a:ext cx="0" cy="0"/>
+          <a:chOff x="0" y="0"/>
+          <a:chExt cx="0" cy="0"/>
+        </a:xfrm>
+      </p:grpSpPr>
+      <p:sp>
+        <p:nvSpPr>
+          <p:cNvPr id="2" name="Slide Image Placeholder 1"/>
+          <p:cNvSpPr>
+            <a:spLocks noGrp="1" noRot="1" noChangeAspect="1"/>
+          </p:cNvSpPr>
+          <p:nvPr>
+            <p:ph type="sldImg"/>
+          </p:nvPr>
+        </p:nvSpPr>
+        <p:spPr/>
+      </p:sp>
+      <p:sp>
+        <p:nvSpPr>
+          <p:cNvPr id="3" name="Notes Placeholder 2"/>
+          <p:cNvSpPr>
+            <a:spLocks noGrp="1"/>
+          </p:cNvSpPr>
+          <p:nvPr>
+            <p:ph type="body" idx="1"/>
+          </p:nvPr>
+        </p:nvSpPr>
+        <p:spPr/>
+        <p:txBody>
+          <a:bodyPr/>
+          <a:lstStyle/>
+          <a:p>
+            <a:endParaRPr lang="en-US"/>
+          </a:p>
+        </p:txBody>
+      </p:sp>
+      <p:sp>
+        <p:nvSpPr>
+          <p:cNvPr id="4" name="Slide Number Placeholder 3"/>
+          <p:cNvSpPr>
+            <a:spLocks noGrp="1"/>
+          </p:cNvSpPr>
+          <p:nvPr>
+            <p:ph type="sldNum" sz="quarter" idx="10"/>
+          </p:nvPr>
+        </p:nvSpPr>
+        <p:spPr/>
+        <p:txBody>
+          <a:bodyPr/>
+          <a:lstStyle/>
+          <a:p>
+            <a:fld id="{B3E9124A-7BF9-46DF-BFFC-8F8BB6FC65EB}" type="slidenum">
+              <a:rPr lang="en-US" smtClean="0"/>
+              <a:t>8</a:t>
             </a:fld>
             <a:endParaRPr lang="en-US"/>
           </a:p>
@@ -944,7 +1350,7 @@
                 </a:solidFill>
               </a:rPr>
               <a:pPr/>
-              <a:t>3/15/2016</a:t>
+              <a:t>3/16/2016</a:t>
             </a:fld>
             <a:endParaRPr lang="en-US">
               <a:solidFill>
@@ -1158,7 +1564,7 @@
                 </a:solidFill>
               </a:rPr>
               <a:pPr/>
-              <a:t>3/15/2016</a:t>
+              <a:t>3/16/2016</a:t>
             </a:fld>
             <a:endParaRPr lang="en-US">
               <a:solidFill>
@@ -1375,7 +1781,7 @@
                 </a:solidFill>
               </a:rPr>
               <a:pPr/>
-              <a:t>3/15/2016</a:t>
+              <a:t>3/16/2016</a:t>
             </a:fld>
             <a:endParaRPr lang="en-US">
               <a:solidFill>
@@ -1658,7 +2064,7 @@
                 </a:solidFill>
               </a:rPr>
               <a:pPr/>
-              <a:t>3/15/2016</a:t>
+              <a:t>3/16/2016</a:t>
             </a:fld>
             <a:endParaRPr lang="en-US">
               <a:solidFill>
@@ -1969,7 +2375,7 @@
                 </a:solidFill>
               </a:rPr>
               <a:pPr/>
-              <a:t>3/15/2016</a:t>
+              <a:t>3/16/2016</a:t>
             </a:fld>
             <a:endParaRPr lang="en-US">
               <a:solidFill>
@@ -2416,7 +2822,7 @@
                 </a:solidFill>
               </a:rPr>
               <a:pPr/>
-              <a:t>3/15/2016</a:t>
+              <a:t>3/16/2016</a:t>
             </a:fld>
             <a:endParaRPr lang="en-US">
               <a:solidFill>
@@ -2824,7 +3230,7 @@
                 </a:solidFill>
               </a:rPr>
               <a:pPr/>
-              <a:t>3/15/2016</a:t>
+              <a:t>3/16/2016</a:t>
             </a:fld>
             <a:endParaRPr lang="en-US">
               <a:solidFill>
@@ -3093,7 +3499,7 @@
                 </a:solidFill>
               </a:rPr>
               <a:pPr/>
-              <a:t>3/15/2016</a:t>
+              <a:t>3/16/2016</a:t>
             </a:fld>
             <a:endParaRPr lang="en-US">
               <a:solidFill>
@@ -3225,7 +3631,7 @@
                 </a:solidFill>
               </a:rPr>
               <a:pPr/>
-              <a:t>3/15/2016</a:t>
+              <a:t>3/16/2016</a:t>
             </a:fld>
             <a:endParaRPr lang="en-US">
               <a:solidFill>
@@ -3555,7 +3961,7 @@
                 </a:solidFill>
               </a:rPr>
               <a:pPr/>
-              <a:t>3/15/2016</a:t>
+              <a:t>3/16/2016</a:t>
             </a:fld>
             <a:endParaRPr lang="en-US">
               <a:solidFill>
@@ -3866,7 +4272,7 @@
                 </a:solidFill>
               </a:rPr>
               <a:pPr/>
-              <a:t>3/15/2016</a:t>
+              <a:t>3/16/2016</a:t>
             </a:fld>
             <a:endParaRPr lang="en-US">
               <a:solidFill>
@@ -4118,7 +4524,7 @@
                 </a:solidFill>
               </a:rPr>
               <a:pPr/>
-              <a:t>3/15/2016</a:t>
+              <a:t>3/16/2016</a:t>
             </a:fld>
             <a:endParaRPr lang="en-US">
               <a:solidFill>
@@ -4687,6 +5093,1446 @@
           <a:lstStyle/>
           <a:p>
             <a:r>
+              <a:rPr lang="en-US" dirty="0" err="1">
+                <a:effectLst/>
+              </a:rPr>
+              <a:t>Noster</a:t>
+            </a:r>
+            <a:r>
+              <a:rPr lang="en-US" dirty="0">
+                <a:effectLst/>
+              </a:rPr>
+              <a:t> </a:t>
+            </a:r>
+            <a:r>
+              <a:rPr lang="en-US" dirty="0" err="1">
+                <a:effectLst/>
+              </a:rPr>
+              <a:t>poēta</a:t>
+            </a:r>
+            <a:r>
+              <a:rPr lang="en-US" dirty="0">
+                <a:effectLst/>
+              </a:rPr>
+              <a:t> , nisi </a:t>
+            </a:r>
+            <a:r>
+              <a:rPr lang="en-US" dirty="0" err="1">
+                <a:effectLst/>
+              </a:rPr>
+              <a:t>cīvis</a:t>
+            </a:r>
+            <a:r>
+              <a:rPr lang="en-US" dirty="0">
+                <a:effectLst/>
+              </a:rPr>
+              <a:t> </a:t>
+            </a:r>
+            <a:r>
+              <a:rPr lang="en-US" dirty="0" err="1">
+                <a:effectLst/>
+              </a:rPr>
+              <a:t>Rōmānus</a:t>
+            </a:r>
+            <a:r>
+              <a:rPr lang="en-US" dirty="0">
+                <a:effectLst/>
+              </a:rPr>
+              <a:t> </a:t>
+            </a:r>
+            <a:r>
+              <a:rPr lang="en-US" dirty="0" err="1">
+                <a:effectLst/>
+              </a:rPr>
+              <a:t>esset</a:t>
+            </a:r>
+            <a:r>
+              <a:rPr lang="en-US" dirty="0">
+                <a:effectLst/>
+              </a:rPr>
+              <a:t> , ā </a:t>
+            </a:r>
+            <a:r>
+              <a:rPr lang="en-US" dirty="0" smtClean="0">
+                <a:effectLst/>
+              </a:rPr>
+              <a:t/>
+            </a:r>
+            <a:br>
+              <a:rPr lang="en-US" dirty="0" smtClean="0">
+                <a:effectLst/>
+              </a:rPr>
+            </a:br>
+            <a:r>
+              <a:rPr lang="en-US" dirty="0" err="1" smtClean="0">
+                <a:effectLst/>
+              </a:rPr>
+              <a:t>populō</a:t>
+            </a:r>
+            <a:r>
+              <a:rPr lang="en-US" dirty="0">
+                <a:effectLst/>
+              </a:rPr>
+              <a:t> </a:t>
+            </a:r>
+            <a:r>
+              <a:rPr lang="en-US" dirty="0" err="1">
+                <a:effectLst/>
+              </a:rPr>
+              <a:t>nunc</a:t>
+            </a:r>
+            <a:r>
+              <a:rPr lang="en-US" dirty="0">
+                <a:effectLst/>
+              </a:rPr>
+              <a:t> </a:t>
+            </a:r>
+            <a:r>
+              <a:rPr lang="en-US" dirty="0" err="1">
+                <a:effectLst/>
+              </a:rPr>
+              <a:t>cīvitāte</a:t>
+            </a:r>
+            <a:r>
+              <a:rPr lang="en-US" dirty="0">
+                <a:effectLst/>
+              </a:rPr>
+              <a:t> </a:t>
+            </a:r>
+            <a:r>
+              <a:rPr lang="en-US" dirty="0" err="1">
+                <a:effectLst/>
+              </a:rPr>
+              <a:t>dōnārētur</a:t>
+            </a:r>
+            <a:r>
+              <a:rPr lang="en-US" dirty="0">
+                <a:effectLst/>
+              </a:rPr>
+              <a:t> .</a:t>
+            </a:r>
+            <a:endParaRPr lang="en-US" dirty="0"/>
+          </a:p>
+        </p:txBody>
+      </p:sp>
+      <p:pic>
+        <p:nvPicPr>
+          <p:cNvPr id="4" name="Content Placeholder 3"/>
+          <p:cNvPicPr>
+            <a:picLocks noGrp="1" noChangeAspect="1"/>
+          </p:cNvPicPr>
+          <p:nvPr>
+            <p:ph idx="1"/>
+          </p:nvPr>
+        </p:nvPicPr>
+        <p:blipFill>
+          <a:blip r:embed="rId2">
+            <a:clrChange>
+              <a:clrFrom>
+                <a:srgbClr val="F2F2F2"/>
+              </a:clrFrom>
+              <a:clrTo>
+                <a:srgbClr val="F2F2F2">
+                  <a:alpha val="0"/>
+                </a:srgbClr>
+              </a:clrTo>
+            </a:clrChange>
+            <a:extLst>
+              <a:ext uri="{28A0092B-C50C-407E-A947-70E740481C1C}">
+                <a14:useLocalDpi xmlns:a14="http://schemas.microsoft.com/office/drawing/2010/main" val="0"/>
+              </a:ext>
+            </a:extLst>
+          </a:blip>
+          <a:stretch>
+            <a:fillRect/>
+          </a:stretch>
+        </p:blipFill>
+        <p:spPr>
+          <a:xfrm>
+            <a:off x="3165774" y="1600200"/>
+            <a:ext cx="5860451" cy="4525963"/>
+          </a:xfrm>
+        </p:spPr>
+      </p:pic>
+    </p:spTree>
+    <p:extLst>
+      <p:ext uri="{BB962C8B-B14F-4D97-AF65-F5344CB8AC3E}">
+        <p14:creationId xmlns:p14="http://schemas.microsoft.com/office/powerpoint/2010/main" val="3627201457"/>
+      </p:ext>
+    </p:extLst>
+  </p:cSld>
+  <p:clrMapOvr>
+    <a:masterClrMapping/>
+  </p:clrMapOvr>
+</p:sld>
+</file>
+
+<file path=ppt/slides/slide10.xml><?xml version="1.0" encoding="utf-8"?>
+<p:sld xmlns:a="http://schemas.openxmlformats.org/drawingml/2006/main" xmlns:r="http://schemas.openxmlformats.org/officeDocument/2006/relationships" xmlns:p="http://schemas.openxmlformats.org/presentationml/2006/main">
+  <p:cSld>
+    <p:spTree>
+      <p:nvGrpSpPr>
+        <p:cNvPr id="1" name=""/>
+        <p:cNvGrpSpPr/>
+        <p:nvPr/>
+      </p:nvGrpSpPr>
+      <p:grpSpPr>
+        <a:xfrm>
+          <a:off x="0" y="0"/>
+          <a:ext cx="0" cy="0"/>
+          <a:chOff x="0" y="0"/>
+          <a:chExt cx="0" cy="0"/>
+        </a:xfrm>
+      </p:grpSpPr>
+      <p:sp>
+        <p:nvSpPr>
+          <p:cNvPr id="2" name="Title 1"/>
+          <p:cNvSpPr>
+            <a:spLocks noGrp="1"/>
+          </p:cNvSpPr>
+          <p:nvPr>
+            <p:ph type="title"/>
+          </p:nvPr>
+        </p:nvSpPr>
+        <p:spPr/>
+        <p:txBody>
+          <a:bodyPr/>
+          <a:lstStyle/>
+          <a:p>
+            <a:endParaRPr lang="en-US"/>
+          </a:p>
+        </p:txBody>
+      </p:sp>
+      <p:sp>
+        <p:nvSpPr>
+          <p:cNvPr id="3" name="Content Placeholder 2"/>
+          <p:cNvSpPr>
+            <a:spLocks noGrp="1"/>
+          </p:cNvSpPr>
+          <p:nvPr>
+            <p:ph idx="1"/>
+          </p:nvPr>
+        </p:nvSpPr>
+        <p:spPr/>
+        <p:txBody>
+          <a:bodyPr/>
+          <a:lstStyle/>
+          <a:p>
+            <a:endParaRPr lang="en-US"/>
+          </a:p>
+        </p:txBody>
+      </p:sp>
+    </p:spTree>
+    <p:extLst>
+      <p:ext uri="{BB962C8B-B14F-4D97-AF65-F5344CB8AC3E}">
+        <p14:creationId xmlns:p14="http://schemas.microsoft.com/office/powerpoint/2010/main" val="2782782934"/>
+      </p:ext>
+    </p:extLst>
+  </p:cSld>
+  <p:clrMapOvr>
+    <a:masterClrMapping/>
+  </p:clrMapOvr>
+</p:sld>
+</file>
+
+<file path=ppt/slides/slide11.xml><?xml version="1.0" encoding="utf-8"?>
+<p:sld xmlns:a="http://schemas.openxmlformats.org/drawingml/2006/main" xmlns:r="http://schemas.openxmlformats.org/officeDocument/2006/relationships" xmlns:p="http://schemas.openxmlformats.org/presentationml/2006/main">
+  <p:cSld>
+    <p:spTree>
+      <p:nvGrpSpPr>
+        <p:cNvPr id="1" name=""/>
+        <p:cNvGrpSpPr/>
+        <p:nvPr/>
+      </p:nvGrpSpPr>
+      <p:grpSpPr>
+        <a:xfrm>
+          <a:off x="0" y="0"/>
+          <a:ext cx="0" cy="0"/>
+          <a:chOff x="0" y="0"/>
+          <a:chExt cx="0" cy="0"/>
+        </a:xfrm>
+      </p:grpSpPr>
+      <p:sp>
+        <p:nvSpPr>
+          <p:cNvPr id="2" name="Title 1"/>
+          <p:cNvSpPr>
+            <a:spLocks noGrp="1"/>
+          </p:cNvSpPr>
+          <p:nvPr>
+            <p:ph type="title"/>
+          </p:nvPr>
+        </p:nvSpPr>
+        <p:spPr/>
+        <p:txBody>
+          <a:bodyPr/>
+          <a:lstStyle/>
+          <a:p>
+            <a:endParaRPr lang="en-US"/>
+          </a:p>
+        </p:txBody>
+      </p:sp>
+      <p:sp>
+        <p:nvSpPr>
+          <p:cNvPr id="3" name="Content Placeholder 2"/>
+          <p:cNvSpPr>
+            <a:spLocks noGrp="1"/>
+          </p:cNvSpPr>
+          <p:nvPr>
+            <p:ph idx="1"/>
+          </p:nvPr>
+        </p:nvSpPr>
+        <p:spPr/>
+        <p:txBody>
+          <a:bodyPr/>
+          <a:lstStyle/>
+          <a:p>
+            <a:endParaRPr lang="en-US"/>
+          </a:p>
+        </p:txBody>
+      </p:sp>
+    </p:spTree>
+    <p:extLst>
+      <p:ext uri="{BB962C8B-B14F-4D97-AF65-F5344CB8AC3E}">
+        <p14:creationId xmlns:p14="http://schemas.microsoft.com/office/powerpoint/2010/main" val="94337934"/>
+      </p:ext>
+    </p:extLst>
+  </p:cSld>
+  <p:clrMapOvr>
+    <a:masterClrMapping/>
+  </p:clrMapOvr>
+</p:sld>
+</file>
+
+<file path=ppt/slides/slide2.xml><?xml version="1.0" encoding="utf-8"?>
+<p:sld xmlns:a="http://schemas.openxmlformats.org/drawingml/2006/main" xmlns:r="http://schemas.openxmlformats.org/officeDocument/2006/relationships" xmlns:p="http://schemas.openxmlformats.org/presentationml/2006/main">
+  <p:cSld>
+    <p:spTree>
+      <p:nvGrpSpPr>
+        <p:cNvPr id="1" name=""/>
+        <p:cNvGrpSpPr/>
+        <p:nvPr/>
+      </p:nvGrpSpPr>
+      <p:grpSpPr>
+        <a:xfrm>
+          <a:off x="0" y="0"/>
+          <a:ext cx="0" cy="0"/>
+          <a:chOff x="0" y="0"/>
+          <a:chExt cx="0" cy="0"/>
+        </a:xfrm>
+      </p:grpSpPr>
+      <p:sp>
+        <p:nvSpPr>
+          <p:cNvPr id="2" name="Title 1"/>
+          <p:cNvSpPr>
+            <a:spLocks noGrp="1"/>
+          </p:cNvSpPr>
+          <p:nvPr>
+            <p:ph type="title"/>
+          </p:nvPr>
+        </p:nvSpPr>
+        <p:spPr/>
+        <p:txBody>
+          <a:bodyPr/>
+          <a:lstStyle/>
+          <a:p>
+            <a:r>
+              <a:rPr lang="en-US" dirty="0" err="1">
+                <a:effectLst/>
+              </a:rPr>
+              <a:t>Noster</a:t>
+            </a:r>
+            <a:r>
+              <a:rPr lang="en-US" dirty="0">
+                <a:effectLst/>
+              </a:rPr>
+              <a:t> </a:t>
+            </a:r>
+            <a:r>
+              <a:rPr lang="en-US" dirty="0" err="1">
+                <a:effectLst/>
+              </a:rPr>
+              <a:t>poēta</a:t>
+            </a:r>
+            <a:r>
+              <a:rPr lang="en-US" dirty="0">
+                <a:effectLst/>
+              </a:rPr>
+              <a:t> , nisi </a:t>
+            </a:r>
+            <a:r>
+              <a:rPr lang="en-US" dirty="0" err="1">
+                <a:effectLst/>
+              </a:rPr>
+              <a:t>cīvis</a:t>
+            </a:r>
+            <a:r>
+              <a:rPr lang="en-US" dirty="0">
+                <a:effectLst/>
+              </a:rPr>
+              <a:t> </a:t>
+            </a:r>
+            <a:r>
+              <a:rPr lang="en-US" dirty="0" err="1">
+                <a:effectLst/>
+              </a:rPr>
+              <a:t>Rōmānus</a:t>
+            </a:r>
+            <a:r>
+              <a:rPr lang="en-US" dirty="0">
+                <a:effectLst/>
+              </a:rPr>
+              <a:t> </a:t>
+            </a:r>
+            <a:r>
+              <a:rPr lang="en-US" dirty="0" err="1">
+                <a:effectLst/>
+              </a:rPr>
+              <a:t>esset</a:t>
+            </a:r>
+            <a:r>
+              <a:rPr lang="en-US" dirty="0">
+                <a:effectLst/>
+              </a:rPr>
+              <a:t> , ā </a:t>
+            </a:r>
+            <a:br>
+              <a:rPr lang="en-US" dirty="0">
+                <a:effectLst/>
+              </a:rPr>
+            </a:br>
+            <a:r>
+              <a:rPr lang="en-US" dirty="0" err="1">
+                <a:effectLst/>
+              </a:rPr>
+              <a:t>populō</a:t>
+            </a:r>
+            <a:r>
+              <a:rPr lang="en-US" dirty="0">
+                <a:effectLst/>
+              </a:rPr>
+              <a:t> </a:t>
+            </a:r>
+            <a:r>
+              <a:rPr lang="en-US" dirty="0" err="1">
+                <a:effectLst/>
+              </a:rPr>
+              <a:t>nunc</a:t>
+            </a:r>
+            <a:r>
+              <a:rPr lang="en-US" dirty="0">
+                <a:effectLst/>
+              </a:rPr>
+              <a:t> </a:t>
+            </a:r>
+            <a:r>
+              <a:rPr lang="en-US" dirty="0" err="1">
+                <a:effectLst/>
+              </a:rPr>
+              <a:t>cīvitāte</a:t>
+            </a:r>
+            <a:r>
+              <a:rPr lang="en-US" dirty="0">
+                <a:effectLst/>
+              </a:rPr>
+              <a:t> </a:t>
+            </a:r>
+            <a:r>
+              <a:rPr lang="en-US" dirty="0" err="1">
+                <a:effectLst/>
+              </a:rPr>
+              <a:t>dōnārētur</a:t>
+            </a:r>
+            <a:r>
+              <a:rPr lang="en-US" dirty="0">
+                <a:effectLst/>
+              </a:rPr>
+              <a:t> .</a:t>
+            </a:r>
+            <a:endParaRPr lang="en-US" dirty="0"/>
+          </a:p>
+        </p:txBody>
+      </p:sp>
+      <p:pic>
+        <p:nvPicPr>
+          <p:cNvPr id="6" name="Content Placeholder 5"/>
+          <p:cNvPicPr>
+            <a:picLocks noGrp="1" noChangeAspect="1"/>
+          </p:cNvPicPr>
+          <p:nvPr>
+            <p:ph idx="1"/>
+          </p:nvPr>
+        </p:nvPicPr>
+        <p:blipFill>
+          <a:blip r:embed="rId3">
+            <a:clrChange>
+              <a:clrFrom>
+                <a:srgbClr val="F2F2F2"/>
+              </a:clrFrom>
+              <a:clrTo>
+                <a:srgbClr val="F2F2F2">
+                  <a:alpha val="0"/>
+                </a:srgbClr>
+              </a:clrTo>
+            </a:clrChange>
+            <a:extLst>
+              <a:ext uri="{28A0092B-C50C-407E-A947-70E740481C1C}">
+                <a14:useLocalDpi xmlns:a14="http://schemas.microsoft.com/office/drawing/2010/main" val="0"/>
+              </a:ext>
+            </a:extLst>
+          </a:blip>
+          <a:stretch>
+            <a:fillRect/>
+          </a:stretch>
+        </p:blipFill>
+        <p:spPr>
+          <a:xfrm>
+            <a:off x="1543236" y="1713053"/>
+            <a:ext cx="8627054" cy="4074289"/>
+          </a:xfrm>
+        </p:spPr>
+      </p:pic>
+    </p:spTree>
+    <p:extLst>
+      <p:ext uri="{BB962C8B-B14F-4D97-AF65-F5344CB8AC3E}">
+        <p14:creationId xmlns:p14="http://schemas.microsoft.com/office/powerpoint/2010/main" val="4071930204"/>
+      </p:ext>
+    </p:extLst>
+  </p:cSld>
+  <p:clrMapOvr>
+    <a:masterClrMapping/>
+  </p:clrMapOvr>
+</p:sld>
+</file>
+
+<file path=ppt/slides/slide3.xml><?xml version="1.0" encoding="utf-8"?>
+<p:sld xmlns:a="http://schemas.openxmlformats.org/drawingml/2006/main" xmlns:r="http://schemas.openxmlformats.org/officeDocument/2006/relationships" xmlns:p="http://schemas.openxmlformats.org/presentationml/2006/main">
+  <p:cSld>
+    <p:spTree>
+      <p:nvGrpSpPr>
+        <p:cNvPr id="1" name=""/>
+        <p:cNvGrpSpPr/>
+        <p:nvPr/>
+      </p:nvGrpSpPr>
+      <p:grpSpPr>
+        <a:xfrm>
+          <a:off x="0" y="0"/>
+          <a:ext cx="0" cy="0"/>
+          <a:chOff x="0" y="0"/>
+          <a:chExt cx="0" cy="0"/>
+        </a:xfrm>
+      </p:grpSpPr>
+      <p:sp>
+        <p:nvSpPr>
+          <p:cNvPr id="2" name="Title 1"/>
+          <p:cNvSpPr>
+            <a:spLocks noGrp="1"/>
+          </p:cNvSpPr>
+          <p:nvPr>
+            <p:ph type="title"/>
+          </p:nvPr>
+        </p:nvSpPr>
+        <p:spPr/>
+        <p:txBody>
+          <a:bodyPr/>
+          <a:lstStyle/>
+          <a:p>
+            <a:r>
+              <a:rPr lang="en-US" dirty="0" err="1">
+                <a:effectLst/>
+              </a:rPr>
+              <a:t>Noster</a:t>
+            </a:r>
+            <a:r>
+              <a:rPr lang="en-US" dirty="0">
+                <a:effectLst/>
+              </a:rPr>
+              <a:t> </a:t>
+            </a:r>
+            <a:r>
+              <a:rPr lang="en-US" dirty="0" err="1">
+                <a:effectLst/>
+              </a:rPr>
+              <a:t>poēta</a:t>
+            </a:r>
+            <a:r>
+              <a:rPr lang="en-US" dirty="0">
+                <a:effectLst/>
+              </a:rPr>
+              <a:t> , nisi </a:t>
+            </a:r>
+            <a:r>
+              <a:rPr lang="en-US" dirty="0" err="1">
+                <a:effectLst/>
+              </a:rPr>
+              <a:t>cīvis</a:t>
+            </a:r>
+            <a:r>
+              <a:rPr lang="en-US" dirty="0">
+                <a:effectLst/>
+              </a:rPr>
+              <a:t> </a:t>
+            </a:r>
+            <a:r>
+              <a:rPr lang="en-US" dirty="0" err="1">
+                <a:effectLst/>
+              </a:rPr>
+              <a:t>Rōmānus</a:t>
+            </a:r>
+            <a:r>
+              <a:rPr lang="en-US" dirty="0">
+                <a:effectLst/>
+              </a:rPr>
+              <a:t> </a:t>
+            </a:r>
+            <a:r>
+              <a:rPr lang="en-US" dirty="0" err="1">
+                <a:effectLst/>
+              </a:rPr>
+              <a:t>esset</a:t>
+            </a:r>
+            <a:r>
+              <a:rPr lang="en-US" dirty="0">
+                <a:effectLst/>
+              </a:rPr>
+              <a:t> , ā </a:t>
+            </a:r>
+            <a:br>
+              <a:rPr lang="en-US" dirty="0">
+                <a:effectLst/>
+              </a:rPr>
+            </a:br>
+            <a:r>
+              <a:rPr lang="en-US" dirty="0" err="1">
+                <a:effectLst/>
+              </a:rPr>
+              <a:t>populō</a:t>
+            </a:r>
+            <a:r>
+              <a:rPr lang="en-US" dirty="0">
+                <a:effectLst/>
+              </a:rPr>
+              <a:t> </a:t>
+            </a:r>
+            <a:r>
+              <a:rPr lang="en-US" dirty="0" err="1">
+                <a:effectLst/>
+              </a:rPr>
+              <a:t>nunc</a:t>
+            </a:r>
+            <a:r>
+              <a:rPr lang="en-US" dirty="0">
+                <a:effectLst/>
+              </a:rPr>
+              <a:t> </a:t>
+            </a:r>
+            <a:r>
+              <a:rPr lang="en-US" dirty="0" err="1">
+                <a:effectLst/>
+              </a:rPr>
+              <a:t>cīvitāte</a:t>
+            </a:r>
+            <a:r>
+              <a:rPr lang="en-US" dirty="0">
+                <a:effectLst/>
+              </a:rPr>
+              <a:t> </a:t>
+            </a:r>
+            <a:r>
+              <a:rPr lang="en-US" dirty="0" err="1">
+                <a:effectLst/>
+              </a:rPr>
+              <a:t>dōnārētur</a:t>
+            </a:r>
+            <a:r>
+              <a:rPr lang="en-US" dirty="0">
+                <a:effectLst/>
+              </a:rPr>
+              <a:t> .</a:t>
+            </a:r>
+            <a:endParaRPr lang="en-US" dirty="0"/>
+          </a:p>
+        </p:txBody>
+      </p:sp>
+      <p:pic>
+        <p:nvPicPr>
+          <p:cNvPr id="9" name="Content Placeholder 8"/>
+          <p:cNvPicPr>
+            <a:picLocks noGrp="1" noChangeAspect="1"/>
+          </p:cNvPicPr>
+          <p:nvPr>
+            <p:ph idx="1"/>
+          </p:nvPr>
+        </p:nvPicPr>
+        <p:blipFill>
+          <a:blip r:embed="rId3">
+            <a:extLst>
+              <a:ext uri="{28A0092B-C50C-407E-A947-70E740481C1C}">
+                <a14:useLocalDpi xmlns:a14="http://schemas.microsoft.com/office/drawing/2010/main" val="0"/>
+              </a:ext>
+            </a:extLst>
+          </a:blip>
+          <a:stretch>
+            <a:fillRect/>
+          </a:stretch>
+        </p:blipFill>
+        <p:spPr>
+          <a:xfrm>
+            <a:off x="2546431" y="1500738"/>
+            <a:ext cx="7442522" cy="4953425"/>
+          </a:xfrm>
+        </p:spPr>
+      </p:pic>
+    </p:spTree>
+    <p:extLst>
+      <p:ext uri="{BB962C8B-B14F-4D97-AF65-F5344CB8AC3E}">
+        <p14:creationId xmlns:p14="http://schemas.microsoft.com/office/powerpoint/2010/main" val="672494262"/>
+      </p:ext>
+    </p:extLst>
+  </p:cSld>
+  <p:clrMapOvr>
+    <a:masterClrMapping/>
+  </p:clrMapOvr>
+</p:sld>
+</file>
+
+<file path=ppt/slides/slide4.xml><?xml version="1.0" encoding="utf-8"?>
+<p:sld xmlns:a="http://schemas.openxmlformats.org/drawingml/2006/main" xmlns:r="http://schemas.openxmlformats.org/officeDocument/2006/relationships" xmlns:p="http://schemas.openxmlformats.org/presentationml/2006/main">
+  <p:cSld>
+    <p:spTree>
+      <p:nvGrpSpPr>
+        <p:cNvPr id="1" name=""/>
+        <p:cNvGrpSpPr/>
+        <p:nvPr/>
+      </p:nvGrpSpPr>
+      <p:grpSpPr>
+        <a:xfrm>
+          <a:off x="0" y="0"/>
+          <a:ext cx="0" cy="0"/>
+          <a:chOff x="0" y="0"/>
+          <a:chExt cx="0" cy="0"/>
+        </a:xfrm>
+      </p:grpSpPr>
+      <p:sp>
+        <p:nvSpPr>
+          <p:cNvPr id="2" name="Title 1"/>
+          <p:cNvSpPr>
+            <a:spLocks noGrp="1"/>
+          </p:cNvSpPr>
+          <p:nvPr>
+            <p:ph type="title"/>
+          </p:nvPr>
+        </p:nvSpPr>
+        <p:spPr/>
+        <p:txBody>
+          <a:bodyPr/>
+          <a:lstStyle/>
+          <a:p>
+            <a:r>
+              <a:rPr lang="en-US" dirty="0" err="1">
+                <a:effectLst/>
+              </a:rPr>
+              <a:t>Noster</a:t>
+            </a:r>
+            <a:r>
+              <a:rPr lang="en-US" dirty="0">
+                <a:effectLst/>
+              </a:rPr>
+              <a:t> </a:t>
+            </a:r>
+            <a:r>
+              <a:rPr lang="en-US" dirty="0" err="1">
+                <a:effectLst/>
+              </a:rPr>
+              <a:t>poēta</a:t>
+            </a:r>
+            <a:r>
+              <a:rPr lang="en-US" dirty="0">
+                <a:effectLst/>
+              </a:rPr>
+              <a:t> , nisi </a:t>
+            </a:r>
+            <a:r>
+              <a:rPr lang="en-US" dirty="0" err="1">
+                <a:effectLst/>
+              </a:rPr>
+              <a:t>cīvis</a:t>
+            </a:r>
+            <a:r>
+              <a:rPr lang="en-US" dirty="0">
+                <a:effectLst/>
+              </a:rPr>
+              <a:t> </a:t>
+            </a:r>
+            <a:r>
+              <a:rPr lang="en-US" dirty="0" err="1">
+                <a:effectLst/>
+              </a:rPr>
+              <a:t>Rōmānus</a:t>
+            </a:r>
+            <a:r>
+              <a:rPr lang="en-US" dirty="0">
+                <a:effectLst/>
+              </a:rPr>
+              <a:t> </a:t>
+            </a:r>
+            <a:r>
+              <a:rPr lang="en-US" dirty="0" err="1">
+                <a:effectLst/>
+              </a:rPr>
+              <a:t>esset</a:t>
+            </a:r>
+            <a:r>
+              <a:rPr lang="en-US" dirty="0">
+                <a:effectLst/>
+              </a:rPr>
+              <a:t> , ā </a:t>
+            </a:r>
+            <a:br>
+              <a:rPr lang="en-US" dirty="0">
+                <a:effectLst/>
+              </a:rPr>
+            </a:br>
+            <a:r>
+              <a:rPr lang="en-US" dirty="0" err="1">
+                <a:effectLst/>
+              </a:rPr>
+              <a:t>populō</a:t>
+            </a:r>
+            <a:r>
+              <a:rPr lang="en-US" dirty="0">
+                <a:effectLst/>
+              </a:rPr>
+              <a:t> </a:t>
+            </a:r>
+            <a:r>
+              <a:rPr lang="en-US" dirty="0" err="1">
+                <a:effectLst/>
+              </a:rPr>
+              <a:t>nunc</a:t>
+            </a:r>
+            <a:r>
+              <a:rPr lang="en-US" dirty="0">
+                <a:effectLst/>
+              </a:rPr>
+              <a:t> </a:t>
+            </a:r>
+            <a:r>
+              <a:rPr lang="en-US" dirty="0" err="1">
+                <a:effectLst/>
+              </a:rPr>
+              <a:t>cīvitāte</a:t>
+            </a:r>
+            <a:r>
+              <a:rPr lang="en-US" dirty="0">
+                <a:effectLst/>
+              </a:rPr>
+              <a:t> </a:t>
+            </a:r>
+            <a:r>
+              <a:rPr lang="en-US" dirty="0" err="1">
+                <a:effectLst/>
+              </a:rPr>
+              <a:t>dōnārētur</a:t>
+            </a:r>
+            <a:r>
+              <a:rPr lang="en-US" dirty="0">
+                <a:effectLst/>
+              </a:rPr>
+              <a:t> .</a:t>
+            </a:r>
+            <a:endParaRPr lang="en-US" dirty="0"/>
+          </a:p>
+        </p:txBody>
+      </p:sp>
+      <p:pic>
+        <p:nvPicPr>
+          <p:cNvPr id="4" name="Content Placeholder 3"/>
+          <p:cNvPicPr>
+            <a:picLocks noGrp="1" noChangeAspect="1"/>
+          </p:cNvPicPr>
+          <p:nvPr>
+            <p:ph idx="1"/>
+          </p:nvPr>
+        </p:nvPicPr>
+        <p:blipFill>
+          <a:blip r:embed="rId3">
+            <a:clrChange>
+              <a:clrFrom>
+                <a:srgbClr val="FFFFFF"/>
+              </a:clrFrom>
+              <a:clrTo>
+                <a:srgbClr val="FFFFFF">
+                  <a:alpha val="0"/>
+                </a:srgbClr>
+              </a:clrTo>
+            </a:clrChange>
+            <a:extLst>
+              <a:ext uri="{28A0092B-C50C-407E-A947-70E740481C1C}">
+                <a14:useLocalDpi xmlns:a14="http://schemas.microsoft.com/office/drawing/2010/main" val="0"/>
+              </a:ext>
+            </a:extLst>
+          </a:blip>
+          <a:stretch>
+            <a:fillRect/>
+          </a:stretch>
+        </p:blipFill>
+        <p:spPr>
+          <a:xfrm>
+            <a:off x="1139887" y="1724629"/>
+            <a:ext cx="9497248" cy="4098044"/>
+          </a:xfrm>
+        </p:spPr>
+      </p:pic>
+    </p:spTree>
+    <p:extLst>
+      <p:ext uri="{BB962C8B-B14F-4D97-AF65-F5344CB8AC3E}">
+        <p14:creationId xmlns:p14="http://schemas.microsoft.com/office/powerpoint/2010/main" val="3225240593"/>
+      </p:ext>
+    </p:extLst>
+  </p:cSld>
+  <p:clrMapOvr>
+    <a:masterClrMapping/>
+  </p:clrMapOvr>
+</p:sld>
+</file>
+
+<file path=ppt/slides/slide5.xml><?xml version="1.0" encoding="utf-8"?>
+<p:sld xmlns:a="http://schemas.openxmlformats.org/drawingml/2006/main" xmlns:r="http://schemas.openxmlformats.org/officeDocument/2006/relationships" xmlns:p="http://schemas.openxmlformats.org/presentationml/2006/main">
+  <p:cSld>
+    <p:spTree>
+      <p:nvGrpSpPr>
+        <p:cNvPr id="1" name=""/>
+        <p:cNvGrpSpPr/>
+        <p:nvPr/>
+      </p:nvGrpSpPr>
+      <p:grpSpPr>
+        <a:xfrm>
+          <a:off x="0" y="0"/>
+          <a:ext cx="0" cy="0"/>
+          <a:chOff x="0" y="0"/>
+          <a:chExt cx="0" cy="0"/>
+        </a:xfrm>
+      </p:grpSpPr>
+      <p:sp>
+        <p:nvSpPr>
+          <p:cNvPr id="2" name="Title 1"/>
+          <p:cNvSpPr>
+            <a:spLocks noGrp="1"/>
+          </p:cNvSpPr>
+          <p:nvPr>
+            <p:ph type="title"/>
+          </p:nvPr>
+        </p:nvSpPr>
+        <p:spPr/>
+        <p:txBody>
+          <a:bodyPr/>
+          <a:lstStyle/>
+          <a:p>
+            <a:r>
+              <a:rPr lang="en-US" dirty="0" err="1">
+                <a:effectLst/>
+              </a:rPr>
+              <a:t>Noster</a:t>
+            </a:r>
+            <a:r>
+              <a:rPr lang="en-US" dirty="0">
+                <a:effectLst/>
+              </a:rPr>
+              <a:t> </a:t>
+            </a:r>
+            <a:r>
+              <a:rPr lang="en-US" dirty="0" err="1">
+                <a:effectLst/>
+              </a:rPr>
+              <a:t>poēta</a:t>
+            </a:r>
+            <a:r>
+              <a:rPr lang="en-US" dirty="0">
+                <a:effectLst/>
+              </a:rPr>
+              <a:t> , nisi </a:t>
+            </a:r>
+            <a:r>
+              <a:rPr lang="en-US" dirty="0" err="1">
+                <a:effectLst/>
+              </a:rPr>
+              <a:t>cīvis</a:t>
+            </a:r>
+            <a:r>
+              <a:rPr lang="en-US" dirty="0">
+                <a:effectLst/>
+              </a:rPr>
+              <a:t> </a:t>
+            </a:r>
+            <a:r>
+              <a:rPr lang="en-US" dirty="0" err="1">
+                <a:effectLst/>
+              </a:rPr>
+              <a:t>Rōmānus</a:t>
+            </a:r>
+            <a:r>
+              <a:rPr lang="en-US" dirty="0">
+                <a:effectLst/>
+              </a:rPr>
+              <a:t> </a:t>
+            </a:r>
+            <a:r>
+              <a:rPr lang="en-US" dirty="0" err="1">
+                <a:effectLst/>
+              </a:rPr>
+              <a:t>esset</a:t>
+            </a:r>
+            <a:r>
+              <a:rPr lang="en-US" dirty="0">
+                <a:effectLst/>
+              </a:rPr>
+              <a:t> , ā </a:t>
+            </a:r>
+            <a:br>
+              <a:rPr lang="en-US" dirty="0">
+                <a:effectLst/>
+              </a:rPr>
+            </a:br>
+            <a:r>
+              <a:rPr lang="en-US" dirty="0" err="1">
+                <a:effectLst/>
+              </a:rPr>
+              <a:t>populō</a:t>
+            </a:r>
+            <a:r>
+              <a:rPr lang="en-US" dirty="0">
+                <a:effectLst/>
+              </a:rPr>
+              <a:t> </a:t>
+            </a:r>
+            <a:r>
+              <a:rPr lang="en-US" dirty="0" err="1">
+                <a:effectLst/>
+              </a:rPr>
+              <a:t>nunc</a:t>
+            </a:r>
+            <a:r>
+              <a:rPr lang="en-US" dirty="0">
+                <a:effectLst/>
+              </a:rPr>
+              <a:t> </a:t>
+            </a:r>
+            <a:r>
+              <a:rPr lang="en-US" dirty="0" err="1">
+                <a:effectLst/>
+              </a:rPr>
+              <a:t>cīvitāte</a:t>
+            </a:r>
+            <a:r>
+              <a:rPr lang="en-US" dirty="0">
+                <a:effectLst/>
+              </a:rPr>
+              <a:t> </a:t>
+            </a:r>
+            <a:r>
+              <a:rPr lang="en-US" dirty="0" err="1">
+                <a:effectLst/>
+              </a:rPr>
+              <a:t>dōnārētur</a:t>
+            </a:r>
+            <a:r>
+              <a:rPr lang="en-US" dirty="0">
+                <a:effectLst/>
+              </a:rPr>
+              <a:t> .</a:t>
+            </a:r>
+            <a:endParaRPr lang="en-US" dirty="0"/>
+          </a:p>
+        </p:txBody>
+      </p:sp>
+      <p:sp>
+        <p:nvSpPr>
+          <p:cNvPr id="3" name="Content Placeholder 2"/>
+          <p:cNvSpPr>
+            <a:spLocks noGrp="1"/>
+          </p:cNvSpPr>
+          <p:nvPr>
+            <p:ph idx="1"/>
+          </p:nvPr>
+        </p:nvSpPr>
+        <p:spPr/>
+        <p:txBody>
+          <a:bodyPr/>
+          <a:lstStyle/>
+          <a:p>
+            <a:r>
+              <a:rPr lang="en-US" dirty="0"/>
+              <a:t>&lt;word id="</a:t>
+            </a:r>
+            <a:r>
+              <a:rPr lang="en-US" dirty="0">
+                <a:solidFill>
+                  <a:schemeClr val="tx1"/>
+                </a:solidFill>
+              </a:rPr>
+              <a:t>5</a:t>
+            </a:r>
+            <a:r>
+              <a:rPr lang="en-US" dirty="0"/>
+              <a:t>" form="</a:t>
+            </a:r>
+            <a:r>
+              <a:rPr lang="en-US" dirty="0" err="1"/>
+              <a:t>cīvis</a:t>
+            </a:r>
+            <a:r>
+              <a:rPr lang="en-US" dirty="0"/>
+              <a:t>" lemma="</a:t>
+            </a:r>
+            <a:r>
+              <a:rPr lang="en-US" dirty="0" err="1">
+                <a:solidFill>
+                  <a:srgbClr val="FF0000"/>
+                </a:solidFill>
+              </a:rPr>
+              <a:t>cīvis</a:t>
+            </a:r>
+            <a:r>
+              <a:rPr lang="en-US" dirty="0"/>
+              <a:t>" </a:t>
+            </a:r>
+            <a:r>
+              <a:rPr lang="en-US" dirty="0" err="1"/>
+              <a:t>postag</a:t>
+            </a:r>
+            <a:r>
+              <a:rPr lang="en-US" dirty="0"/>
+              <a:t>="</a:t>
+            </a:r>
+            <a:r>
+              <a:rPr lang="en-US" dirty="0">
+                <a:solidFill>
+                  <a:srgbClr val="FF0000"/>
+                </a:solidFill>
+              </a:rPr>
+              <a:t>n-s---</a:t>
+            </a:r>
+            <a:r>
+              <a:rPr lang="en-US" dirty="0" err="1">
+                <a:solidFill>
+                  <a:srgbClr val="FF0000"/>
+                </a:solidFill>
+              </a:rPr>
+              <a:t>mn</a:t>
+            </a:r>
+            <a:r>
+              <a:rPr lang="en-US" dirty="0">
+                <a:solidFill>
+                  <a:srgbClr val="FF0000"/>
+                </a:solidFill>
+              </a:rPr>
+              <a:t>-</a:t>
+            </a:r>
+            <a:r>
+              <a:rPr lang="en-US" dirty="0"/>
+              <a:t>" relation="</a:t>
+            </a:r>
+            <a:r>
+              <a:rPr lang="en-US" dirty="0" err="1">
+                <a:solidFill>
+                  <a:srgbClr val="FF0000"/>
+                </a:solidFill>
+              </a:rPr>
+              <a:t>Pnom</a:t>
+            </a:r>
+            <a:r>
+              <a:rPr lang="en-US" dirty="0"/>
+              <a:t>" head="</a:t>
+            </a:r>
+            <a:r>
+              <a:rPr lang="en-US" dirty="0">
+                <a:solidFill>
+                  <a:srgbClr val="FF0000"/>
+                </a:solidFill>
+              </a:rPr>
+              <a:t>7</a:t>
+            </a:r>
+            <a:r>
+              <a:rPr lang="en-US" dirty="0"/>
+              <a:t>"/&gt;</a:t>
+            </a:r>
+          </a:p>
+          <a:p>
+            <a:r>
+              <a:rPr lang="en-US" dirty="0"/>
+              <a:t>      &lt;word id="6" form="</a:t>
+            </a:r>
+            <a:r>
+              <a:rPr lang="en-US" dirty="0" err="1">
+                <a:solidFill>
+                  <a:schemeClr val="tx1"/>
+                </a:solidFill>
+              </a:rPr>
+              <a:t>Rōmānus</a:t>
+            </a:r>
+            <a:r>
+              <a:rPr lang="en-US" dirty="0"/>
+              <a:t>" lemma="</a:t>
+            </a:r>
+            <a:r>
+              <a:rPr lang="en-US" dirty="0" err="1">
+                <a:solidFill>
+                  <a:srgbClr val="FF0000"/>
+                </a:solidFill>
+              </a:rPr>
+              <a:t>Rōmānus</a:t>
+            </a:r>
+            <a:r>
+              <a:rPr lang="en-US" dirty="0"/>
+              <a:t>" </a:t>
+            </a:r>
+            <a:r>
+              <a:rPr lang="en-US" dirty="0" err="1"/>
+              <a:t>postag</a:t>
+            </a:r>
+            <a:r>
+              <a:rPr lang="en-US" dirty="0"/>
+              <a:t>="</a:t>
+            </a:r>
+            <a:r>
+              <a:rPr lang="en-US" dirty="0">
+                <a:solidFill>
+                  <a:srgbClr val="FF0000"/>
+                </a:solidFill>
+              </a:rPr>
+              <a:t>a-s---</a:t>
+            </a:r>
+            <a:r>
+              <a:rPr lang="en-US" dirty="0" err="1">
+                <a:solidFill>
+                  <a:srgbClr val="FF0000"/>
+                </a:solidFill>
+              </a:rPr>
+              <a:t>mn</a:t>
+            </a:r>
+            <a:r>
+              <a:rPr lang="en-US" dirty="0">
+                <a:solidFill>
+                  <a:srgbClr val="FF0000"/>
+                </a:solidFill>
+              </a:rPr>
+              <a:t>_</a:t>
+            </a:r>
+            <a:r>
+              <a:rPr lang="en-US" dirty="0"/>
+              <a:t>" relation="</a:t>
+            </a:r>
+            <a:r>
+              <a:rPr lang="en-US" dirty="0" err="1">
+                <a:solidFill>
+                  <a:srgbClr val="FF0000"/>
+                </a:solidFill>
+              </a:rPr>
+              <a:t>Atr</a:t>
+            </a:r>
+            <a:r>
+              <a:rPr lang="en-US" dirty="0"/>
+              <a:t>" head="</a:t>
+            </a:r>
+            <a:r>
+              <a:rPr lang="en-US" dirty="0">
+                <a:solidFill>
+                  <a:srgbClr val="FF0000"/>
+                </a:solidFill>
+              </a:rPr>
+              <a:t>5</a:t>
+            </a:r>
+            <a:r>
+              <a:rPr lang="en-US" dirty="0"/>
+              <a:t>"/&gt;</a:t>
+            </a:r>
+          </a:p>
+          <a:p>
+            <a:r>
+              <a:rPr lang="en-US" dirty="0"/>
+              <a:t>      &lt;word id="7" form="</a:t>
+            </a:r>
+            <a:r>
+              <a:rPr lang="en-US" dirty="0" err="1"/>
+              <a:t>esset</a:t>
+            </a:r>
+            <a:r>
+              <a:rPr lang="en-US" dirty="0"/>
+              <a:t>" lemma="</a:t>
+            </a:r>
+            <a:r>
+              <a:rPr lang="en-US" dirty="0">
+                <a:solidFill>
+                  <a:srgbClr val="FF0000"/>
+                </a:solidFill>
+              </a:rPr>
+              <a:t>sum</a:t>
+            </a:r>
+            <a:r>
+              <a:rPr lang="en-US" dirty="0"/>
+              <a:t>" </a:t>
+            </a:r>
+            <a:r>
+              <a:rPr lang="en-US" dirty="0" err="1"/>
+              <a:t>postag</a:t>
+            </a:r>
+            <a:r>
+              <a:rPr lang="en-US" dirty="0"/>
+              <a:t>="</a:t>
+            </a:r>
+            <a:r>
+              <a:rPr lang="en-US" dirty="0">
+                <a:solidFill>
+                  <a:srgbClr val="FF0000"/>
+                </a:solidFill>
+              </a:rPr>
+              <a:t>v3sisa---</a:t>
+            </a:r>
+            <a:r>
+              <a:rPr lang="en-US" dirty="0"/>
+              <a:t>" relation="</a:t>
+            </a:r>
+            <a:r>
+              <a:rPr lang="en-US" dirty="0" err="1">
+                <a:solidFill>
+                  <a:srgbClr val="FF0000"/>
+                </a:solidFill>
+              </a:rPr>
+              <a:t>CondCl</a:t>
+            </a:r>
+            <a:r>
+              <a:rPr lang="en-US" dirty="0"/>
+              <a:t>" head="</a:t>
+            </a:r>
+            <a:r>
+              <a:rPr lang="en-US" dirty="0">
+                <a:solidFill>
+                  <a:srgbClr val="FF0000"/>
+                </a:solidFill>
+              </a:rPr>
+              <a:t>4</a:t>
+            </a:r>
+            <a:r>
+              <a:rPr lang="en-US" dirty="0"/>
+              <a:t>"/&gt;</a:t>
+            </a:r>
+          </a:p>
+        </p:txBody>
+      </p:sp>
+    </p:spTree>
+    <p:extLst>
+      <p:ext uri="{BB962C8B-B14F-4D97-AF65-F5344CB8AC3E}">
+        <p14:creationId xmlns:p14="http://schemas.microsoft.com/office/powerpoint/2010/main" val="3074557693"/>
+      </p:ext>
+    </p:extLst>
+  </p:cSld>
+  <p:clrMapOvr>
+    <a:masterClrMapping/>
+  </p:clrMapOvr>
+</p:sld>
+</file>
+
+<file path=ppt/slides/slide6.xml><?xml version="1.0" encoding="utf-8"?>
+<p:sld xmlns:a="http://schemas.openxmlformats.org/drawingml/2006/main" xmlns:r="http://schemas.openxmlformats.org/officeDocument/2006/relationships" xmlns:p="http://schemas.openxmlformats.org/presentationml/2006/main">
+  <p:cSld>
+    <p:spTree>
+      <p:nvGrpSpPr>
+        <p:cNvPr id="1" name=""/>
+        <p:cNvGrpSpPr/>
+        <p:nvPr/>
+      </p:nvGrpSpPr>
+      <p:grpSpPr>
+        <a:xfrm>
+          <a:off x="0" y="0"/>
+          <a:ext cx="0" cy="0"/>
+          <a:chOff x="0" y="0"/>
+          <a:chExt cx="0" cy="0"/>
+        </a:xfrm>
+      </p:grpSpPr>
+      <p:sp>
+        <p:nvSpPr>
+          <p:cNvPr id="2" name="Title 1"/>
+          <p:cNvSpPr>
+            <a:spLocks noGrp="1"/>
+          </p:cNvSpPr>
+          <p:nvPr>
+            <p:ph type="title"/>
+          </p:nvPr>
+        </p:nvSpPr>
+        <p:spPr/>
+        <p:txBody>
+          <a:bodyPr/>
+          <a:lstStyle/>
+          <a:p>
+            <a:endParaRPr lang="en-US"/>
+          </a:p>
+        </p:txBody>
+      </p:sp>
+      <p:sp>
+        <p:nvSpPr>
+          <p:cNvPr id="3" name="Content Placeholder 2"/>
+          <p:cNvSpPr>
+            <a:spLocks noGrp="1"/>
+          </p:cNvSpPr>
+          <p:nvPr>
+            <p:ph idx="1"/>
+          </p:nvPr>
+        </p:nvSpPr>
+        <p:spPr/>
+        <p:txBody>
+          <a:bodyPr/>
+          <a:lstStyle/>
+          <a:p>
+            <a:endParaRPr lang="en-US"/>
+          </a:p>
+        </p:txBody>
+      </p:sp>
+    </p:spTree>
+    <p:extLst>
+      <p:ext uri="{BB962C8B-B14F-4D97-AF65-F5344CB8AC3E}">
+        <p14:creationId xmlns:p14="http://schemas.microsoft.com/office/powerpoint/2010/main" val="10401693"/>
+      </p:ext>
+    </p:extLst>
+  </p:cSld>
+  <p:clrMapOvr>
+    <a:masterClrMapping/>
+  </p:clrMapOvr>
+</p:sld>
+</file>
+
+<file path=ppt/slides/slide7.xml><?xml version="1.0" encoding="utf-8"?>
+<p:sld xmlns:a="http://schemas.openxmlformats.org/drawingml/2006/main" xmlns:r="http://schemas.openxmlformats.org/officeDocument/2006/relationships" xmlns:p="http://schemas.openxmlformats.org/presentationml/2006/main">
+  <p:cSld>
+    <p:spTree>
+      <p:nvGrpSpPr>
+        <p:cNvPr id="1" name=""/>
+        <p:cNvGrpSpPr/>
+        <p:nvPr/>
+      </p:nvGrpSpPr>
+      <p:grpSpPr>
+        <a:xfrm>
+          <a:off x="0" y="0"/>
+          <a:ext cx="0" cy="0"/>
+          <a:chOff x="0" y="0"/>
+          <a:chExt cx="0" cy="0"/>
+        </a:xfrm>
+      </p:grpSpPr>
+      <p:sp>
+        <p:nvSpPr>
+          <p:cNvPr id="2" name="Title 1"/>
+          <p:cNvSpPr>
+            <a:spLocks noGrp="1"/>
+          </p:cNvSpPr>
+          <p:nvPr>
+            <p:ph type="title"/>
+          </p:nvPr>
+        </p:nvSpPr>
+        <p:spPr/>
+        <p:txBody>
+          <a:bodyPr/>
+          <a:lstStyle/>
+          <a:p>
+            <a:r>
               <a:rPr lang="en-US" dirty="0" smtClean="0"/>
               <a:t>Usefulness of data?</a:t>
             </a:r>
@@ -4763,7 +6609,7 @@
 </p:sld>
 </file>
 
-<file path=ppt/slides/slide2.xml><?xml version="1.0" encoding="utf-8"?>
+<file path=ppt/slides/slide8.xml><?xml version="1.0" encoding="utf-8"?>
 <p:sld xmlns:a="http://schemas.openxmlformats.org/drawingml/2006/main" xmlns:r="http://schemas.openxmlformats.org/officeDocument/2006/relationships" xmlns:p="http://schemas.openxmlformats.org/presentationml/2006/main">
   <p:cSld>
     <p:spTree>
@@ -4851,7 +6697,7 @@
 </p:sld>
 </file>
 
-<file path=ppt/slides/slide3.xml><?xml version="1.0" encoding="utf-8"?>
+<file path=ppt/slides/slide9.xml><?xml version="1.0" encoding="utf-8"?>
 <p:sld xmlns:a="http://schemas.openxmlformats.org/drawingml/2006/main" xmlns:r="http://schemas.openxmlformats.org/officeDocument/2006/relationships" xmlns:p="http://schemas.openxmlformats.org/presentationml/2006/main">
   <p:cSld>
     <p:spTree>
@@ -4910,142 +6756,6 @@
     <p:extLst>
       <p:ext uri="{BB962C8B-B14F-4D97-AF65-F5344CB8AC3E}">
         <p14:creationId xmlns:p14="http://schemas.microsoft.com/office/powerpoint/2010/main" val="2313706660"/>
-      </p:ext>
-    </p:extLst>
-  </p:cSld>
-  <p:clrMapOvr>
-    <a:masterClrMapping/>
-  </p:clrMapOvr>
-</p:sld>
-</file>
-
-<file path=ppt/slides/slide4.xml><?xml version="1.0" encoding="utf-8"?>
-<p:sld xmlns:a="http://schemas.openxmlformats.org/drawingml/2006/main" xmlns:r="http://schemas.openxmlformats.org/officeDocument/2006/relationships" xmlns:p="http://schemas.openxmlformats.org/presentationml/2006/main">
-  <p:cSld>
-    <p:spTree>
-      <p:nvGrpSpPr>
-        <p:cNvPr id="1" name=""/>
-        <p:cNvGrpSpPr/>
-        <p:nvPr/>
-      </p:nvGrpSpPr>
-      <p:grpSpPr>
-        <a:xfrm>
-          <a:off x="0" y="0"/>
-          <a:ext cx="0" cy="0"/>
-          <a:chOff x="0" y="0"/>
-          <a:chExt cx="0" cy="0"/>
-        </a:xfrm>
-      </p:grpSpPr>
-      <p:sp>
-        <p:nvSpPr>
-          <p:cNvPr id="2" name="Title 1"/>
-          <p:cNvSpPr>
-            <a:spLocks noGrp="1"/>
-          </p:cNvSpPr>
-          <p:nvPr>
-            <p:ph type="title"/>
-          </p:nvPr>
-        </p:nvSpPr>
-        <p:spPr/>
-        <p:txBody>
-          <a:bodyPr/>
-          <a:lstStyle/>
-          <a:p>
-            <a:endParaRPr lang="en-US"/>
-          </a:p>
-        </p:txBody>
-      </p:sp>
-      <p:sp>
-        <p:nvSpPr>
-          <p:cNvPr id="3" name="Content Placeholder 2"/>
-          <p:cNvSpPr>
-            <a:spLocks noGrp="1"/>
-          </p:cNvSpPr>
-          <p:nvPr>
-            <p:ph idx="1"/>
-          </p:nvPr>
-        </p:nvSpPr>
-        <p:spPr/>
-        <p:txBody>
-          <a:bodyPr/>
-          <a:lstStyle/>
-          <a:p>
-            <a:endParaRPr lang="en-US"/>
-          </a:p>
-        </p:txBody>
-      </p:sp>
-    </p:spTree>
-    <p:extLst>
-      <p:ext uri="{BB962C8B-B14F-4D97-AF65-F5344CB8AC3E}">
-        <p14:creationId xmlns:p14="http://schemas.microsoft.com/office/powerpoint/2010/main" val="2782782934"/>
-      </p:ext>
-    </p:extLst>
-  </p:cSld>
-  <p:clrMapOvr>
-    <a:masterClrMapping/>
-  </p:clrMapOvr>
-</p:sld>
-</file>
-
-<file path=ppt/slides/slide5.xml><?xml version="1.0" encoding="utf-8"?>
-<p:sld xmlns:a="http://schemas.openxmlformats.org/drawingml/2006/main" xmlns:r="http://schemas.openxmlformats.org/officeDocument/2006/relationships" xmlns:p="http://schemas.openxmlformats.org/presentationml/2006/main">
-  <p:cSld>
-    <p:spTree>
-      <p:nvGrpSpPr>
-        <p:cNvPr id="1" name=""/>
-        <p:cNvGrpSpPr/>
-        <p:nvPr/>
-      </p:nvGrpSpPr>
-      <p:grpSpPr>
-        <a:xfrm>
-          <a:off x="0" y="0"/>
-          <a:ext cx="0" cy="0"/>
-          <a:chOff x="0" y="0"/>
-          <a:chExt cx="0" cy="0"/>
-        </a:xfrm>
-      </p:grpSpPr>
-      <p:sp>
-        <p:nvSpPr>
-          <p:cNvPr id="2" name="Title 1"/>
-          <p:cNvSpPr>
-            <a:spLocks noGrp="1"/>
-          </p:cNvSpPr>
-          <p:nvPr>
-            <p:ph type="title"/>
-          </p:nvPr>
-        </p:nvSpPr>
-        <p:spPr/>
-        <p:txBody>
-          <a:bodyPr/>
-          <a:lstStyle/>
-          <a:p>
-            <a:endParaRPr lang="en-US"/>
-          </a:p>
-        </p:txBody>
-      </p:sp>
-      <p:sp>
-        <p:nvSpPr>
-          <p:cNvPr id="3" name="Content Placeholder 2"/>
-          <p:cNvSpPr>
-            <a:spLocks noGrp="1"/>
-          </p:cNvSpPr>
-          <p:nvPr>
-            <p:ph idx="1"/>
-          </p:nvPr>
-        </p:nvSpPr>
-        <p:spPr/>
-        <p:txBody>
-          <a:bodyPr/>
-          <a:lstStyle/>
-          <a:p>
-            <a:endParaRPr lang="en-US"/>
-          </a:p>
-        </p:txBody>
-      </p:sp>
-    </p:spTree>
-    <p:extLst>
-      <p:ext uri="{BB962C8B-B14F-4D97-AF65-F5344CB8AC3E}">
-        <p14:creationId xmlns:p14="http://schemas.microsoft.com/office/powerpoint/2010/main" val="94337934"/>
       </p:ext>
     </p:extLst>
   </p:cSld>

</xml_diff>